<commit_message>
minor updates to presentation.ppt
</commit_message>
<xml_diff>
--- a/presentation.pptx
+++ b/presentation.pptx
@@ -11,18 +11,20 @@
     <p:sldId id="271" r:id="rId5"/>
     <p:sldId id="260" r:id="rId6"/>
     <p:sldId id="265" r:id="rId7"/>
-    <p:sldId id="264" r:id="rId8"/>
-    <p:sldId id="263" r:id="rId9"/>
-    <p:sldId id="266" r:id="rId10"/>
-    <p:sldId id="268" r:id="rId11"/>
-    <p:sldId id="267" r:id="rId12"/>
-    <p:sldId id="269" r:id="rId13"/>
-    <p:sldId id="272" r:id="rId14"/>
-    <p:sldId id="273" r:id="rId15"/>
-    <p:sldId id="261" r:id="rId16"/>
-    <p:sldId id="270" r:id="rId17"/>
-    <p:sldId id="259" r:id="rId18"/>
-    <p:sldId id="262" r:id="rId19"/>
+    <p:sldId id="275" r:id="rId8"/>
+    <p:sldId id="264" r:id="rId9"/>
+    <p:sldId id="263" r:id="rId10"/>
+    <p:sldId id="266" r:id="rId11"/>
+    <p:sldId id="268" r:id="rId12"/>
+    <p:sldId id="267" r:id="rId13"/>
+    <p:sldId id="269" r:id="rId14"/>
+    <p:sldId id="272" r:id="rId15"/>
+    <p:sldId id="274" r:id="rId16"/>
+    <p:sldId id="273" r:id="rId17"/>
+    <p:sldId id="270" r:id="rId18"/>
+    <p:sldId id="261" r:id="rId19"/>
+    <p:sldId id="259" r:id="rId20"/>
+    <p:sldId id="262" r:id="rId21"/>
   </p:sldIdLst>
   <p:sldSz cx="12192000" cy="6858000"/>
   <p:notesSz cx="6858000" cy="9144000"/>
@@ -132,6 +134,7 @@
             <p14:sldId id="271"/>
             <p14:sldId id="260"/>
             <p14:sldId id="265"/>
+            <p14:sldId id="275"/>
             <p14:sldId id="264"/>
             <p14:sldId id="263"/>
             <p14:sldId id="266"/>
@@ -139,9 +142,10 @@
             <p14:sldId id="267"/>
             <p14:sldId id="269"/>
             <p14:sldId id="272"/>
+            <p14:sldId id="274"/>
             <p14:sldId id="273"/>
+            <p14:sldId id="270"/>
             <p14:sldId id="261"/>
-            <p14:sldId id="270"/>
             <p14:sldId id="259"/>
             <p14:sldId id="262"/>
           </p14:sldIdLst>
@@ -302,7 +306,7 @@
           <a:p>
             <a:fld id="{0502B20F-1090-4D19-84B6-9037509FF2B7}" type="datetimeFigureOut">
               <a:rPr lang="en-US" smtClean="0"/>
-              <a:t>2/25/2020</a:t>
+              <a:t>2/26/2020</a:t>
             </a:fld>
             <a:endParaRPr lang="en-US"/>
           </a:p>
@@ -500,7 +504,7 @@
           <a:p>
             <a:fld id="{0502B20F-1090-4D19-84B6-9037509FF2B7}" type="datetimeFigureOut">
               <a:rPr lang="en-US" smtClean="0"/>
-              <a:t>2/25/2020</a:t>
+              <a:t>2/26/2020</a:t>
             </a:fld>
             <a:endParaRPr lang="en-US"/>
           </a:p>
@@ -708,7 +712,7 @@
           <a:p>
             <a:fld id="{0502B20F-1090-4D19-84B6-9037509FF2B7}" type="datetimeFigureOut">
               <a:rPr lang="en-US" smtClean="0"/>
-              <a:t>2/25/2020</a:t>
+              <a:t>2/26/2020</a:t>
             </a:fld>
             <a:endParaRPr lang="en-US"/>
           </a:p>
@@ -906,7 +910,7 @@
           <a:p>
             <a:fld id="{0502B20F-1090-4D19-84B6-9037509FF2B7}" type="datetimeFigureOut">
               <a:rPr lang="en-US" smtClean="0"/>
-              <a:t>2/25/2020</a:t>
+              <a:t>2/26/2020</a:t>
             </a:fld>
             <a:endParaRPr lang="en-US"/>
           </a:p>
@@ -1181,7 +1185,7 @@
           <a:p>
             <a:fld id="{0502B20F-1090-4D19-84B6-9037509FF2B7}" type="datetimeFigureOut">
               <a:rPr lang="en-US" smtClean="0"/>
-              <a:t>2/25/2020</a:t>
+              <a:t>2/26/2020</a:t>
             </a:fld>
             <a:endParaRPr lang="en-US"/>
           </a:p>
@@ -1446,7 +1450,7 @@
           <a:p>
             <a:fld id="{0502B20F-1090-4D19-84B6-9037509FF2B7}" type="datetimeFigureOut">
               <a:rPr lang="en-US" smtClean="0"/>
-              <a:t>2/25/2020</a:t>
+              <a:t>2/26/2020</a:t>
             </a:fld>
             <a:endParaRPr lang="en-US"/>
           </a:p>
@@ -1858,7 +1862,7 @@
           <a:p>
             <a:fld id="{0502B20F-1090-4D19-84B6-9037509FF2B7}" type="datetimeFigureOut">
               <a:rPr lang="en-US" smtClean="0"/>
-              <a:t>2/25/2020</a:t>
+              <a:t>2/26/2020</a:t>
             </a:fld>
             <a:endParaRPr lang="en-US"/>
           </a:p>
@@ -1999,7 +2003,7 @@
           <a:p>
             <a:fld id="{0502B20F-1090-4D19-84B6-9037509FF2B7}" type="datetimeFigureOut">
               <a:rPr lang="en-US" smtClean="0"/>
-              <a:t>2/25/2020</a:t>
+              <a:t>2/26/2020</a:t>
             </a:fld>
             <a:endParaRPr lang="en-US"/>
           </a:p>
@@ -2112,7 +2116,7 @@
           <a:p>
             <a:fld id="{0502B20F-1090-4D19-84B6-9037509FF2B7}" type="datetimeFigureOut">
               <a:rPr lang="en-US" smtClean="0"/>
-              <a:t>2/25/2020</a:t>
+              <a:t>2/26/2020</a:t>
             </a:fld>
             <a:endParaRPr lang="en-US"/>
           </a:p>
@@ -2423,7 +2427,7 @@
           <a:p>
             <a:fld id="{0502B20F-1090-4D19-84B6-9037509FF2B7}" type="datetimeFigureOut">
               <a:rPr lang="en-US" smtClean="0"/>
-              <a:t>2/25/2020</a:t>
+              <a:t>2/26/2020</a:t>
             </a:fld>
             <a:endParaRPr lang="en-US"/>
           </a:p>
@@ -2711,7 +2715,7 @@
           <a:p>
             <a:fld id="{0502B20F-1090-4D19-84B6-9037509FF2B7}" type="datetimeFigureOut">
               <a:rPr lang="en-US" smtClean="0"/>
-              <a:t>2/25/2020</a:t>
+              <a:t>2/26/2020</a:t>
             </a:fld>
             <a:endParaRPr lang="en-US"/>
           </a:p>
@@ -2952,7 +2956,7 @@
           <a:p>
             <a:fld id="{0502B20F-1090-4D19-84B6-9037509FF2B7}" type="datetimeFigureOut">
               <a:rPr lang="en-US" smtClean="0"/>
-              <a:t>2/25/2020</a:t>
+              <a:t>2/26/2020</a:t>
             </a:fld>
             <a:endParaRPr lang="en-US"/>
           </a:p>
@@ -3524,6 +3528,218 @@
           <p:cNvPr id="2" name="Title 1">
             <a:extLst>
               <a:ext uri="{FF2B5EF4-FFF2-40B4-BE49-F238E27FC236}">
+                <a16:creationId xmlns:a16="http://schemas.microsoft.com/office/drawing/2014/main" id="{9AD171FB-ACEA-4089-9386-2524C758BD46}"/>
+              </a:ext>
+            </a:extLst>
+          </p:cNvPr>
+          <p:cNvSpPr>
+            <a:spLocks noGrp="1"/>
+          </p:cNvSpPr>
+          <p:nvPr>
+            <p:ph type="title"/>
+          </p:nvPr>
+        </p:nvSpPr>
+        <p:spPr>
+          <a:xfrm>
+            <a:off x="1061156" y="365126"/>
+            <a:ext cx="10292644" cy="966964"/>
+          </a:xfrm>
+        </p:spPr>
+        <p:txBody>
+          <a:bodyPr/>
+          <a:lstStyle/>
+          <a:p>
+            <a:r>
+              <a:rPr lang="en-US" dirty="0"/>
+              <a:t>View</a:t>
+            </a:r>
+          </a:p>
+        </p:txBody>
+      </p:sp>
+      <p:sp>
+        <p:nvSpPr>
+          <p:cNvPr id="6" name="Content Placeholder 2">
+            <a:extLst>
+              <a:ext uri="{FF2B5EF4-FFF2-40B4-BE49-F238E27FC236}">
+                <a16:creationId xmlns:a16="http://schemas.microsoft.com/office/drawing/2014/main" id="{3B631ABF-B560-42B3-945D-A1F83962A5D9}"/>
+              </a:ext>
+            </a:extLst>
+          </p:cNvPr>
+          <p:cNvSpPr>
+            <a:spLocks noGrp="1"/>
+          </p:cNvSpPr>
+          <p:nvPr>
+            <p:ph idx="1"/>
+          </p:nvPr>
+        </p:nvSpPr>
+        <p:spPr>
+          <a:xfrm>
+            <a:off x="327378" y="1529996"/>
+            <a:ext cx="4007555" cy="4566004"/>
+          </a:xfrm>
+        </p:spPr>
+        <p:txBody>
+          <a:bodyPr>
+            <a:normAutofit fontScale="92500" lnSpcReduction="20000"/>
+          </a:bodyPr>
+          <a:lstStyle/>
+          <a:p>
+            <a:pPr marL="0" indent="0">
+              <a:buNone/>
+            </a:pPr>
+            <a:r>
+              <a:rPr lang="en-US" dirty="0"/>
+              <a:t>Receive request</a:t>
+            </a:r>
+          </a:p>
+          <a:p>
+            <a:endParaRPr lang="en-US" dirty="0"/>
+          </a:p>
+          <a:p>
+            <a:pPr marL="0" indent="0">
+              <a:buNone/>
+            </a:pPr>
+            <a:r>
+              <a:rPr lang="en-US" dirty="0"/>
+              <a:t>If GET:</a:t>
+            </a:r>
+          </a:p>
+          <a:p>
+            <a:pPr marL="457200" lvl="1" indent="0">
+              <a:buNone/>
+            </a:pPr>
+            <a:r>
+              <a:rPr lang="en-US" sz="2000" dirty="0"/>
+              <a:t>Create a blank form and return it</a:t>
+            </a:r>
+            <a:endParaRPr lang="en-US" sz="1600" dirty="0"/>
+          </a:p>
+          <a:p>
+            <a:endParaRPr lang="en-US" dirty="0"/>
+          </a:p>
+          <a:p>
+            <a:pPr marL="0" indent="0">
+              <a:buNone/>
+            </a:pPr>
+            <a:r>
+              <a:rPr lang="en-US" dirty="0"/>
+              <a:t>If POST:</a:t>
+            </a:r>
+          </a:p>
+          <a:p>
+            <a:pPr marL="457200" lvl="1" indent="0">
+              <a:buNone/>
+            </a:pPr>
+            <a:r>
+              <a:rPr lang="en-US" sz="2000" dirty="0"/>
+              <a:t>Create a form using data from the POST (i.e. validate the data)</a:t>
+            </a:r>
+          </a:p>
+          <a:p>
+            <a:pPr marL="457200" lvl="1" indent="0">
+              <a:buNone/>
+            </a:pPr>
+            <a:endParaRPr lang="en-US" sz="2000" dirty="0"/>
+          </a:p>
+          <a:p>
+            <a:pPr marL="457200" lvl="1" indent="0">
+              <a:buNone/>
+            </a:pPr>
+            <a:r>
+              <a:rPr lang="en-US" sz="2000" dirty="0"/>
+              <a:t>If valid – save to DB and redirect to </a:t>
+            </a:r>
+            <a:r>
+              <a:rPr lang="en-US" sz="2000" dirty="0" err="1"/>
+              <a:t>player_home</a:t>
+            </a:r>
+            <a:r>
+              <a:rPr lang="en-US" sz="2000" dirty="0"/>
+              <a:t> page</a:t>
+            </a:r>
+          </a:p>
+          <a:p>
+            <a:pPr marL="457200" lvl="1" indent="0">
+              <a:buNone/>
+            </a:pPr>
+            <a:endParaRPr lang="en-US" sz="2000" dirty="0"/>
+          </a:p>
+          <a:p>
+            <a:pPr marL="457200" lvl="1" indent="0">
+              <a:buNone/>
+            </a:pPr>
+            <a:r>
+              <a:rPr lang="en-US" sz="2000" dirty="0"/>
+              <a:t>If not valid – send form back to user (with errors)</a:t>
+            </a:r>
+          </a:p>
+        </p:txBody>
+      </p:sp>
+      <p:pic>
+        <p:nvPicPr>
+          <p:cNvPr id="8" name="Picture 7">
+            <a:extLst>
+              <a:ext uri="{FF2B5EF4-FFF2-40B4-BE49-F238E27FC236}">
+                <a16:creationId xmlns:a16="http://schemas.microsoft.com/office/drawing/2014/main" id="{9C248E4E-1512-4E81-88B4-C64DC453A8E6}"/>
+              </a:ext>
+            </a:extLst>
+          </p:cNvPr>
+          <p:cNvPicPr>
+            <a:picLocks noChangeAspect="1"/>
+          </p:cNvPicPr>
+          <p:nvPr/>
+        </p:nvPicPr>
+        <p:blipFill>
+          <a:blip r:embed="rId2"/>
+          <a:stretch>
+            <a:fillRect/>
+          </a:stretch>
+        </p:blipFill>
+        <p:spPr>
+          <a:xfrm>
+            <a:off x="4460982" y="1529996"/>
+            <a:ext cx="7403640" cy="4962879"/>
+          </a:xfrm>
+          <a:prstGeom prst="rect">
+            <a:avLst/>
+          </a:prstGeom>
+        </p:spPr>
+      </p:pic>
+    </p:spTree>
+    <p:extLst>
+      <p:ext uri="{BB962C8B-B14F-4D97-AF65-F5344CB8AC3E}">
+        <p14:creationId xmlns:p14="http://schemas.microsoft.com/office/powerpoint/2010/main" val="3033193438"/>
+      </p:ext>
+    </p:extLst>
+  </p:cSld>
+  <p:clrMapOvr>
+    <a:masterClrMapping/>
+  </p:clrMapOvr>
+</p:sld>
+</file>
+
+<file path=ppt/slides/slide11.xml><?xml version="1.0" encoding="utf-8"?>
+<p:sld xmlns:a="http://schemas.openxmlformats.org/drawingml/2006/main" xmlns:r="http://schemas.openxmlformats.org/officeDocument/2006/relationships" xmlns:p="http://schemas.openxmlformats.org/presentationml/2006/main">
+  <p:cSld>
+    <p:spTree>
+      <p:nvGrpSpPr>
+        <p:cNvPr id="1" name=""/>
+        <p:cNvGrpSpPr/>
+        <p:nvPr/>
+      </p:nvGrpSpPr>
+      <p:grpSpPr>
+        <a:xfrm>
+          <a:off x="0" y="0"/>
+          <a:ext cx="0" cy="0"/>
+          <a:chOff x="0" y="0"/>
+          <a:chExt cx="0" cy="0"/>
+        </a:xfrm>
+      </p:grpSpPr>
+      <p:sp>
+        <p:nvSpPr>
+          <p:cNvPr id="2" name="Title 1">
+            <a:extLst>
+              <a:ext uri="{FF2B5EF4-FFF2-40B4-BE49-F238E27FC236}">
                 <a16:creationId xmlns:a16="http://schemas.microsoft.com/office/drawing/2014/main" id="{2B98E9AD-4D00-4A97-BD00-7FF647328E8E}"/>
               </a:ext>
             </a:extLst>
@@ -3838,7 +4054,7 @@
 </p:sld>
 </file>
 
-<file path=ppt/slides/slide11.xml><?xml version="1.0" encoding="utf-8"?>
+<file path=ppt/slides/slide12.xml><?xml version="1.0" encoding="utf-8"?>
 <p:sld xmlns:a="http://schemas.openxmlformats.org/drawingml/2006/main" xmlns:r="http://schemas.openxmlformats.org/officeDocument/2006/relationships" xmlns:p="http://schemas.openxmlformats.org/presentationml/2006/main">
   <p:cSld>
     <p:spTree>
@@ -3926,7 +4142,7 @@
 </p:sld>
 </file>
 
-<file path=ppt/slides/slide12.xml><?xml version="1.0" encoding="utf-8"?>
+<file path=ppt/slides/slide13.xml><?xml version="1.0" encoding="utf-8"?>
 <p:sld xmlns:a="http://schemas.openxmlformats.org/drawingml/2006/main" xmlns:r="http://schemas.openxmlformats.org/officeDocument/2006/relationships" xmlns:p="http://schemas.openxmlformats.org/presentationml/2006/main">
   <p:cSld>
     <p:spTree>
@@ -4091,7 +4307,7 @@
 </p:sld>
 </file>
 
-<file path=ppt/slides/slide13.xml><?xml version="1.0" encoding="utf-8"?>
+<file path=ppt/slides/slide14.xml><?xml version="1.0" encoding="utf-8"?>
 <p:sld xmlns:a="http://schemas.openxmlformats.org/drawingml/2006/main" xmlns:r="http://schemas.openxmlformats.org/officeDocument/2006/relationships" xmlns:p="http://schemas.openxmlformats.org/presentationml/2006/main">
   <p:cSld>
     <p:spTree>
@@ -4238,7 +4454,7 @@
 </p:sld>
 </file>
 
-<file path=ppt/slides/slide14.xml><?xml version="1.0" encoding="utf-8"?>
+<file path=ppt/slides/slide15.xml><?xml version="1.0" encoding="utf-8"?>
 <p:sld xmlns:a="http://schemas.openxmlformats.org/drawingml/2006/main" xmlns:r="http://schemas.openxmlformats.org/officeDocument/2006/relationships" xmlns:p="http://schemas.openxmlformats.org/presentationml/2006/main">
   <p:cSld>
     <p:spTree>
@@ -4260,6 +4476,139 @@
           <p:cNvPr id="2" name="Title 1">
             <a:extLst>
               <a:ext uri="{FF2B5EF4-FFF2-40B4-BE49-F238E27FC236}">
+                <a16:creationId xmlns:a16="http://schemas.microsoft.com/office/drawing/2014/main" id="{4CF05941-5C3A-4FF8-938D-3323D27FC27B}"/>
+              </a:ext>
+            </a:extLst>
+          </p:cNvPr>
+          <p:cNvSpPr>
+            <a:spLocks noGrp="1"/>
+          </p:cNvSpPr>
+          <p:nvPr>
+            <p:ph type="title"/>
+          </p:nvPr>
+        </p:nvSpPr>
+        <p:spPr/>
+        <p:txBody>
+          <a:bodyPr/>
+          <a:lstStyle/>
+          <a:p>
+            <a:r>
+              <a:rPr lang="en-US" dirty="0"/>
+              <a:t>In Summary</a:t>
+            </a:r>
+          </a:p>
+        </p:txBody>
+      </p:sp>
+      <p:sp>
+        <p:nvSpPr>
+          <p:cNvPr id="3" name="Content Placeholder 2">
+            <a:extLst>
+              <a:ext uri="{FF2B5EF4-FFF2-40B4-BE49-F238E27FC236}">
+                <a16:creationId xmlns:a16="http://schemas.microsoft.com/office/drawing/2014/main" id="{E05635DE-BE58-48FD-8C6D-E5D127158D68}"/>
+              </a:ext>
+            </a:extLst>
+          </p:cNvPr>
+          <p:cNvSpPr>
+            <a:spLocks noGrp="1"/>
+          </p:cNvSpPr>
+          <p:nvPr>
+            <p:ph idx="1"/>
+          </p:nvPr>
+        </p:nvSpPr>
+        <p:spPr/>
+        <p:txBody>
+          <a:bodyPr>
+            <a:normAutofit fontScale="92500"/>
+          </a:bodyPr>
+          <a:lstStyle/>
+          <a:p>
+            <a:r>
+              <a:rPr lang="en-US" dirty="0"/>
+              <a:t>Django is Python + DB backend (can you say ML language and models...)</a:t>
+            </a:r>
+          </a:p>
+          <a:p>
+            <a:r>
+              <a:rPr lang="en-US" dirty="0"/>
+              <a:t>User Authentication w/ forms</a:t>
+            </a:r>
+          </a:p>
+          <a:p>
+            <a:r>
+              <a:rPr lang="en-US" dirty="0"/>
+              <a:t>/admin to view/edit project or user DB tables</a:t>
+            </a:r>
+          </a:p>
+          <a:p>
+            <a:r>
+              <a:rPr lang="en-US" dirty="0"/>
+              <a:t>Migrations</a:t>
+            </a:r>
+          </a:p>
+          <a:p>
+            <a:r>
+              <a:rPr lang="en-US" dirty="0"/>
+              <a:t>Apache/PostgreSQL for production (starter DB/WS provided)</a:t>
+            </a:r>
+          </a:p>
+          <a:p>
+            <a:r>
+              <a:rPr lang="en-US" dirty="0"/>
+              <a:t>Crispy forms</a:t>
+            </a:r>
+          </a:p>
+          <a:p>
+            <a:pPr marL="0" indent="0">
+              <a:buNone/>
+            </a:pPr>
+            <a:endParaRPr lang="en-US" dirty="0"/>
+          </a:p>
+          <a:p>
+            <a:pPr marL="0" indent="0">
+              <a:buNone/>
+            </a:pPr>
+            <a:r>
+              <a:rPr lang="en-US" dirty="0"/>
+              <a:t>In summary – Django is production ready Python backend, perfect for exposing ML and data science via web applications.</a:t>
+            </a:r>
+          </a:p>
+        </p:txBody>
+      </p:sp>
+    </p:spTree>
+    <p:extLst>
+      <p:ext uri="{BB962C8B-B14F-4D97-AF65-F5344CB8AC3E}">
+        <p14:creationId xmlns:p14="http://schemas.microsoft.com/office/powerpoint/2010/main" val="2087615427"/>
+      </p:ext>
+    </p:extLst>
+  </p:cSld>
+  <p:clrMapOvr>
+    <a:masterClrMapping/>
+  </p:clrMapOvr>
+</p:sld>
+</file>
+
+<file path=ppt/slides/slide16.xml><?xml version="1.0" encoding="utf-8"?>
+<p:sld xmlns:a="http://schemas.openxmlformats.org/drawingml/2006/main" xmlns:r="http://schemas.openxmlformats.org/officeDocument/2006/relationships" xmlns:p="http://schemas.openxmlformats.org/presentationml/2006/main">
+  <p:cSld>
+    <p:spTree>
+      <p:nvGrpSpPr>
+        <p:cNvPr id="1" name=""/>
+        <p:cNvGrpSpPr/>
+        <p:nvPr/>
+      </p:nvGrpSpPr>
+      <p:grpSpPr>
+        <a:xfrm>
+          <a:off x="0" y="0"/>
+          <a:ext cx="0" cy="0"/>
+          <a:chOff x="0" y="0"/>
+          <a:chExt cx="0" cy="0"/>
+        </a:xfrm>
+      </p:grpSpPr>
+      <p:sp>
+        <p:nvSpPr>
+          <p:cNvPr id="2" name="Title 1">
+            <a:extLst>
+              <a:ext uri="{FF2B5EF4-FFF2-40B4-BE49-F238E27FC236}">
                 <a16:creationId xmlns:a16="http://schemas.microsoft.com/office/drawing/2014/main" id="{B3712D82-7D07-4D28-B03F-7E0703ED43C6}"/>
               </a:ext>
             </a:extLst>
@@ -4278,16 +4627,8 @@
           <a:p>
             <a:r>
               <a:rPr lang="en-US" dirty="0"/>
-              <a:t>Before we get into the code...</a:t>
-            </a:r>
-            <a:br>
-              <a:rPr lang="en-US" dirty="0"/>
-            </a:br>
-            <a:r>
-              <a:rPr lang="en-US" sz="2800" dirty="0"/>
-              <a:t>What’s next...?</a:t>
-            </a:r>
-            <a:endParaRPr lang="en-US" dirty="0"/>
+              <a:t>Next steps ...</a:t>
+            </a:r>
           </a:p>
         </p:txBody>
       </p:sp>
@@ -4307,10 +4648,15 @@
             <p:ph idx="1"/>
           </p:nvPr>
         </p:nvSpPr>
-        <p:spPr/>
+        <p:spPr>
+          <a:xfrm>
+            <a:off x="838200" y="1406480"/>
+            <a:ext cx="10515600" cy="5229211"/>
+          </a:xfrm>
+        </p:spPr>
         <p:txBody>
           <a:bodyPr>
-            <a:normAutofit fontScale="55000" lnSpcReduction="20000"/>
+            <a:normAutofit fontScale="62500" lnSpcReduction="20000"/>
           </a:bodyPr>
           <a:lstStyle/>
           <a:p>
@@ -4369,6 +4715,12 @@
             </a:r>
           </a:p>
           <a:p>
+            <a:r>
+              <a:rPr lang="en-US" dirty="0"/>
+              <a:t>Make a game of it ...</a:t>
+            </a:r>
+          </a:p>
+          <a:p>
             <a:pPr marL="0" indent="0">
               <a:buNone/>
             </a:pPr>
@@ -4392,24 +4744,25 @@
           <a:p>
             <a:r>
               <a:rPr lang="en-US" dirty="0"/>
-              <a:t>Display detail view (macro data + timeseries data) in tabular form</a:t>
-            </a:r>
-          </a:p>
-          <a:p>
-            <a:r>
-              <a:rPr lang="en-US" dirty="0"/>
-              <a:t>Bonus points for a chart – that would involve frontend </a:t>
-            </a:r>
-            <a:r>
-              <a:rPr lang="en-US" dirty="0" err="1"/>
-              <a:t>Javascript</a:t>
-            </a:r>
-            <a:endParaRPr lang="en-US" dirty="0"/>
-          </a:p>
-          <a:p>
-            <a:r>
-              <a:rPr lang="en-US" dirty="0"/>
-              <a:t>Push button to apply the predictive model – and display result</a:t>
+              <a:t>Display detail view (macro data + timeseries data) in tabular form (bonus points for a chart)</a:t>
+            </a:r>
+          </a:p>
+          <a:p>
+            <a:r>
+              <a:rPr lang="en-US" dirty="0"/>
+              <a:t>Have user make a prediction</a:t>
+            </a:r>
+          </a:p>
+          <a:p>
+            <a:r>
+              <a:rPr lang="en-US" dirty="0"/>
+              <a:t>Push button to reveal predictive model, and actual result.</a:t>
+            </a:r>
+          </a:p>
+          <a:p>
+            <a:r>
+              <a:rPr lang="en-US" dirty="0"/>
+              <a:t>Keep score</a:t>
             </a:r>
           </a:p>
         </p:txBody>
@@ -4427,7 +4780,70 @@
 </p:sld>
 </file>
 
-<file path=ppt/slides/slide15.xml><?xml version="1.0" encoding="utf-8"?>
+<file path=ppt/slides/slide17.xml><?xml version="1.0" encoding="utf-8"?>
+<p:sld xmlns:a="http://schemas.openxmlformats.org/drawingml/2006/main" xmlns:r="http://schemas.openxmlformats.org/officeDocument/2006/relationships" xmlns:p="http://schemas.openxmlformats.org/presentationml/2006/main">
+  <p:cSld>
+    <p:spTree>
+      <p:nvGrpSpPr>
+        <p:cNvPr id="1" name=""/>
+        <p:cNvGrpSpPr/>
+        <p:nvPr/>
+      </p:nvGrpSpPr>
+      <p:grpSpPr>
+        <a:xfrm>
+          <a:off x="0" y="0"/>
+          <a:ext cx="0" cy="0"/>
+          <a:chOff x="0" y="0"/>
+          <a:chExt cx="0" cy="0"/>
+        </a:xfrm>
+      </p:grpSpPr>
+      <p:sp>
+        <p:nvSpPr>
+          <p:cNvPr id="2" name="Title 1">
+            <a:extLst>
+              <a:ext uri="{FF2B5EF4-FFF2-40B4-BE49-F238E27FC236}">
+                <a16:creationId xmlns:a16="http://schemas.microsoft.com/office/drawing/2014/main" id="{9362F9D5-F184-4B22-B8A4-0AFA9AA65B3D}"/>
+              </a:ext>
+            </a:extLst>
+          </p:cNvPr>
+          <p:cNvSpPr>
+            <a:spLocks noGrp="1"/>
+          </p:cNvSpPr>
+          <p:nvPr>
+            <p:ph type="title"/>
+          </p:nvPr>
+        </p:nvSpPr>
+        <p:spPr>
+          <a:xfrm>
+            <a:off x="4404048" y="2766218"/>
+            <a:ext cx="2967135" cy="1325563"/>
+          </a:xfrm>
+        </p:spPr>
+        <p:txBody>
+          <a:bodyPr/>
+          <a:lstStyle/>
+          <a:p>
+            <a:r>
+              <a:rPr lang="en-US" dirty="0"/>
+              <a:t>Thank You</a:t>
+            </a:r>
+          </a:p>
+        </p:txBody>
+      </p:sp>
+    </p:spTree>
+    <p:extLst>
+      <p:ext uri="{BB962C8B-B14F-4D97-AF65-F5344CB8AC3E}">
+        <p14:creationId xmlns:p14="http://schemas.microsoft.com/office/powerpoint/2010/main" val="2172409844"/>
+      </p:ext>
+    </p:extLst>
+  </p:cSld>
+  <p:clrMapOvr>
+    <a:masterClrMapping/>
+  </p:clrMapOvr>
+</p:sld>
+</file>
+
+<file path=ppt/slides/slide18.xml><?xml version="1.0" encoding="utf-8"?>
 <p:sld xmlns:a="http://schemas.openxmlformats.org/drawingml/2006/main" xmlns:r="http://schemas.openxmlformats.org/officeDocument/2006/relationships" xmlns:p="http://schemas.openxmlformats.org/presentationml/2006/main">
   <p:cSld>
     <p:spTree>
@@ -4515,70 +4931,7 @@
 </p:sld>
 </file>
 
-<file path=ppt/slides/slide16.xml><?xml version="1.0" encoding="utf-8"?>
-<p:sld xmlns:a="http://schemas.openxmlformats.org/drawingml/2006/main" xmlns:r="http://schemas.openxmlformats.org/officeDocument/2006/relationships" xmlns:p="http://schemas.openxmlformats.org/presentationml/2006/main">
-  <p:cSld>
-    <p:spTree>
-      <p:nvGrpSpPr>
-        <p:cNvPr id="1" name=""/>
-        <p:cNvGrpSpPr/>
-        <p:nvPr/>
-      </p:nvGrpSpPr>
-      <p:grpSpPr>
-        <a:xfrm>
-          <a:off x="0" y="0"/>
-          <a:ext cx="0" cy="0"/>
-          <a:chOff x="0" y="0"/>
-          <a:chExt cx="0" cy="0"/>
-        </a:xfrm>
-      </p:grpSpPr>
-      <p:sp>
-        <p:nvSpPr>
-          <p:cNvPr id="2" name="Title 1">
-            <a:extLst>
-              <a:ext uri="{FF2B5EF4-FFF2-40B4-BE49-F238E27FC236}">
-                <a16:creationId xmlns:a16="http://schemas.microsoft.com/office/drawing/2014/main" id="{9362F9D5-F184-4B22-B8A4-0AFA9AA65B3D}"/>
-              </a:ext>
-            </a:extLst>
-          </p:cNvPr>
-          <p:cNvSpPr>
-            <a:spLocks noGrp="1"/>
-          </p:cNvSpPr>
-          <p:nvPr>
-            <p:ph type="title"/>
-          </p:nvPr>
-        </p:nvSpPr>
-        <p:spPr>
-          <a:xfrm>
-            <a:off x="4404048" y="2766218"/>
-            <a:ext cx="2967135" cy="1325563"/>
-          </a:xfrm>
-        </p:spPr>
-        <p:txBody>
-          <a:bodyPr/>
-          <a:lstStyle/>
-          <a:p>
-            <a:r>
-              <a:rPr lang="en-US" dirty="0"/>
-              <a:t>Thank You</a:t>
-            </a:r>
-          </a:p>
-        </p:txBody>
-      </p:sp>
-    </p:spTree>
-    <p:extLst>
-      <p:ext uri="{BB962C8B-B14F-4D97-AF65-F5344CB8AC3E}">
-        <p14:creationId xmlns:p14="http://schemas.microsoft.com/office/powerpoint/2010/main" val="2172409844"/>
-      </p:ext>
-    </p:extLst>
-  </p:cSld>
-  <p:clrMapOvr>
-    <a:masterClrMapping/>
-  </p:clrMapOvr>
-</p:sld>
-</file>
-
-<file path=ppt/slides/slide17.xml><?xml version="1.0" encoding="utf-8"?>
+<file path=ppt/slides/slide19.xml><?xml version="1.0" encoding="utf-8"?>
 <p:sld xmlns:a="http://schemas.openxmlformats.org/drawingml/2006/main" xmlns:r="http://schemas.openxmlformats.org/officeDocument/2006/relationships" xmlns:p="http://schemas.openxmlformats.org/presentationml/2006/main">
   <p:cSld>
     <p:spTree>
@@ -5065,7 +5418,337 @@
 </p:sld>
 </file>
 
-<file path=ppt/slides/slide18.xml><?xml version="1.0" encoding="utf-8"?>
+<file path=ppt/slides/slide2.xml><?xml version="1.0" encoding="utf-8"?>
+<p:sld xmlns:a="http://schemas.openxmlformats.org/drawingml/2006/main" xmlns:r="http://schemas.openxmlformats.org/officeDocument/2006/relationships" xmlns:p="http://schemas.openxmlformats.org/presentationml/2006/main">
+  <p:cSld>
+    <p:spTree>
+      <p:nvGrpSpPr>
+        <p:cNvPr id="1" name=""/>
+        <p:cNvGrpSpPr/>
+        <p:nvPr/>
+      </p:nvGrpSpPr>
+      <p:grpSpPr>
+        <a:xfrm>
+          <a:off x="0" y="0"/>
+          <a:ext cx="0" cy="0"/>
+          <a:chOff x="0" y="0"/>
+          <a:chExt cx="0" cy="0"/>
+        </a:xfrm>
+      </p:grpSpPr>
+      <p:sp>
+        <p:nvSpPr>
+          <p:cNvPr id="2" name="Title 1">
+            <a:extLst>
+              <a:ext uri="{FF2B5EF4-FFF2-40B4-BE49-F238E27FC236}">
+                <a16:creationId xmlns:a16="http://schemas.microsoft.com/office/drawing/2014/main" id="{E47C0F46-C0C6-470C-9FA7-130887E9E6A1}"/>
+              </a:ext>
+            </a:extLst>
+          </p:cNvPr>
+          <p:cNvSpPr>
+            <a:spLocks noGrp="1"/>
+          </p:cNvSpPr>
+          <p:nvPr>
+            <p:ph type="title"/>
+          </p:nvPr>
+        </p:nvSpPr>
+        <p:spPr/>
+        <p:txBody>
+          <a:bodyPr/>
+          <a:lstStyle/>
+          <a:p>
+            <a:r>
+              <a:rPr lang="en-US" dirty="0"/>
+              <a:t>References...</a:t>
+            </a:r>
+          </a:p>
+        </p:txBody>
+      </p:sp>
+      <p:sp>
+        <p:nvSpPr>
+          <p:cNvPr id="3" name="Content Placeholder 2">
+            <a:extLst>
+              <a:ext uri="{FF2B5EF4-FFF2-40B4-BE49-F238E27FC236}">
+                <a16:creationId xmlns:a16="http://schemas.microsoft.com/office/drawing/2014/main" id="{35A8CADA-0362-42FC-8C94-07F7338AABF8}"/>
+              </a:ext>
+            </a:extLst>
+          </p:cNvPr>
+          <p:cNvSpPr>
+            <a:spLocks noGrp="1"/>
+          </p:cNvSpPr>
+          <p:nvPr>
+            <p:ph idx="1"/>
+          </p:nvPr>
+        </p:nvSpPr>
+        <p:spPr>
+          <a:xfrm>
+            <a:off x="838200" y="1690688"/>
+            <a:ext cx="10515600" cy="4486275"/>
+          </a:xfrm>
+        </p:spPr>
+        <p:txBody>
+          <a:bodyPr>
+            <a:normAutofit fontScale="92500" lnSpcReduction="20000"/>
+          </a:bodyPr>
+          <a:lstStyle/>
+          <a:p>
+            <a:pPr marL="0" indent="0">
+              <a:buNone/>
+            </a:pPr>
+            <a:r>
+              <a:rPr lang="en-US" sz="2000" dirty="0"/>
+              <a:t>Django:</a:t>
+            </a:r>
+          </a:p>
+          <a:p>
+            <a:r>
+              <a:rPr lang="en-US" sz="2000" dirty="0"/>
+              <a:t>"Django Fundamentals“ (</a:t>
+            </a:r>
+            <a:r>
+              <a:rPr lang="en-US" sz="2000" dirty="0" err="1"/>
+              <a:t>Reindert</a:t>
+            </a:r>
+            <a:r>
+              <a:rPr lang="en-US" sz="2000" dirty="0"/>
+              <a:t>-Jan </a:t>
+            </a:r>
+            <a:r>
+              <a:rPr lang="en-US" sz="2000" dirty="0" err="1"/>
+              <a:t>Ekker</a:t>
+            </a:r>
+            <a:r>
+              <a:rPr lang="en-US" sz="2000" dirty="0"/>
+              <a:t>) </a:t>
+            </a:r>
+            <a:r>
+              <a:rPr lang="en-US" sz="2000" dirty="0">
+                <a:hlinkClick r:id="rId2"/>
+              </a:rPr>
+              <a:t>https://app.pluralsight.com</a:t>
+            </a:r>
+            <a:r>
+              <a:rPr lang="en-US" sz="2000" dirty="0"/>
+              <a:t>  This is the “</a:t>
+            </a:r>
+            <a:r>
+              <a:rPr lang="en-US" sz="2000" dirty="0" err="1"/>
+              <a:t>tictactoe</a:t>
+            </a:r>
+            <a:r>
+              <a:rPr lang="en-US" sz="2000" dirty="0"/>
+              <a:t>” application – excellent</a:t>
+            </a:r>
+          </a:p>
+          <a:p>
+            <a:r>
+              <a:rPr lang="en-US" sz="2000" dirty="0"/>
+              <a:t>Django Tutorial </a:t>
+            </a:r>
+            <a:r>
+              <a:rPr lang="en-US" sz="2000" dirty="0">
+                <a:hlinkClick r:id="rId3"/>
+              </a:rPr>
+              <a:t>https://docs.djangoproject.com/en/3.0/intro/tutorial01/</a:t>
+            </a:r>
+            <a:r>
+              <a:rPr lang="en-US" sz="2000" dirty="0"/>
+              <a:t>  Intro from The Source</a:t>
+            </a:r>
+          </a:p>
+          <a:p>
+            <a:pPr marL="0" indent="0">
+              <a:buNone/>
+            </a:pPr>
+            <a:endParaRPr lang="en-US" sz="2000" dirty="0"/>
+          </a:p>
+          <a:p>
+            <a:pPr marL="0" indent="0">
+              <a:buNone/>
+            </a:pPr>
+            <a:r>
+              <a:rPr lang="en-US" sz="2000" dirty="0"/>
+              <a:t>Node, Postgres, Express:</a:t>
+            </a:r>
+          </a:p>
+          <a:p>
+            <a:r>
+              <a:rPr lang="en-US" sz="2000" dirty="0"/>
+              <a:t>“Build a CRUD single page application with Node, Express, Angular, Postgres” (Michael Herman) </a:t>
+            </a:r>
+            <a:r>
+              <a:rPr lang="en-US" sz="2000" dirty="0">
+                <a:solidFill>
+                  <a:schemeClr val="accent1"/>
+                </a:solidFill>
+                <a:hlinkClick r:id="rId4">
+                  <a:extLst>
+                    <a:ext uri="{A12FA001-AC4F-418D-AE19-62706E023703}">
+                      <ahyp:hlinkClr xmlns:ahyp="http://schemas.microsoft.com/office/drawing/2018/hyperlinkcolor" val="tx"/>
+                    </a:ext>
+                  </a:extLst>
+                </a:hlinkClick>
+              </a:rPr>
+              <a:t>https://mherman.org/blog/postgresql-and-nodejs/</a:t>
+            </a:r>
+            <a:r>
+              <a:rPr lang="en-US" sz="2000" dirty="0">
+                <a:solidFill>
+                  <a:schemeClr val="accent1"/>
+                </a:solidFill>
+              </a:rPr>
+              <a:t>   </a:t>
+            </a:r>
+            <a:r>
+              <a:rPr lang="en-US" sz="2000" dirty="0"/>
+              <a:t>This is an example frontend/backend </a:t>
+            </a:r>
+            <a:r>
+              <a:rPr lang="en-US" sz="2000" dirty="0" err="1"/>
+              <a:t>javascript</a:t>
+            </a:r>
+            <a:r>
+              <a:rPr lang="en-US" sz="2000" dirty="0"/>
+              <a:t> web app with </a:t>
+            </a:r>
+            <a:r>
+              <a:rPr lang="en-US" sz="2000" dirty="0" err="1"/>
+              <a:t>postgres</a:t>
+            </a:r>
+            <a:r>
+              <a:rPr lang="en-US" sz="2000" dirty="0"/>
+              <a:t> db.  It uses express web server/routing and (a little) angular on the front-end.  You will use </a:t>
+            </a:r>
+            <a:r>
+              <a:rPr lang="en-US" sz="2000" dirty="0" err="1"/>
+              <a:t>npm</a:t>
+            </a:r>
+            <a:r>
+              <a:rPr lang="en-US" sz="2000" dirty="0"/>
+              <a:t>, express, node, browser trace/debug features.  You will see </a:t>
+            </a:r>
+            <a:r>
+              <a:rPr lang="en-US" sz="2000" dirty="0" err="1"/>
+              <a:t>javascript</a:t>
+            </a:r>
+            <a:r>
+              <a:rPr lang="en-US" sz="2000" dirty="0"/>
+              <a:t> used on both client and server.  This is very standard (server-side </a:t>
+            </a:r>
+            <a:r>
+              <a:rPr lang="en-US" sz="2000" dirty="0" err="1"/>
+              <a:t>javascript</a:t>
+            </a:r>
+            <a:r>
+              <a:rPr lang="en-US" sz="2000" dirty="0"/>
+              <a:t>) architecture.</a:t>
+            </a:r>
+          </a:p>
+          <a:p>
+            <a:pPr marL="0" indent="0">
+              <a:buNone/>
+            </a:pPr>
+            <a:endParaRPr lang="en-US" sz="2000" dirty="0"/>
+          </a:p>
+          <a:p>
+            <a:pPr marL="0" indent="0">
+              <a:buNone/>
+            </a:pPr>
+            <a:r>
+              <a:rPr lang="en-US" sz="2000" dirty="0"/>
+              <a:t>Front-end:</a:t>
+            </a:r>
+          </a:p>
+          <a:p>
+            <a:r>
+              <a:rPr lang="en-US" sz="2000" dirty="0"/>
+              <a:t>“Front-End Web Development Quick Start With HTML5, CSS, and JavaScript” (Shawn Wildermuth) </a:t>
+            </a:r>
+            <a:r>
+              <a:rPr lang="en-US" sz="2000" dirty="0">
+                <a:solidFill>
+                  <a:schemeClr val="accent1"/>
+                </a:solidFill>
+                <a:hlinkClick r:id="rId5">
+                  <a:extLst>
+                    <a:ext uri="{A12FA001-AC4F-418D-AE19-62706E023703}">
+                      <ahyp:hlinkClr xmlns:ahyp="http://schemas.microsoft.com/office/drawing/2018/hyperlinkcolor" val="tx"/>
+                    </a:ext>
+                  </a:extLst>
+                </a:hlinkClick>
+              </a:rPr>
+              <a:t>https://app.pluralsight.com/course-player?clipId=e5482b13-c204-4d52-89ec-94a1099592b0</a:t>
+            </a:r>
+            <a:r>
+              <a:rPr lang="en-US" sz="2000" dirty="0">
+                <a:solidFill>
+                  <a:schemeClr val="accent1"/>
+                </a:solidFill>
+              </a:rPr>
+              <a:t>  </a:t>
+            </a:r>
+            <a:r>
+              <a:rPr lang="en-US" sz="2000" dirty="0"/>
+              <a:t>Beginner HTML5, CSS, JavaScript – excellent</a:t>
+            </a:r>
+          </a:p>
+          <a:p>
+            <a:pPr marL="0" indent="0">
+              <a:buNone/>
+            </a:pPr>
+            <a:endParaRPr lang="en-US" sz="2000" dirty="0"/>
+          </a:p>
+          <a:p>
+            <a:pPr marL="0" indent="0">
+              <a:buNone/>
+            </a:pPr>
+            <a:endParaRPr lang="en-US" sz="2000" dirty="0"/>
+          </a:p>
+          <a:p>
+            <a:pPr marL="0" indent="0">
+              <a:buNone/>
+            </a:pPr>
+            <a:endParaRPr lang="en-US" sz="2000" dirty="0"/>
+          </a:p>
+          <a:p>
+            <a:pPr marL="0" indent="0">
+              <a:buNone/>
+            </a:pPr>
+            <a:endParaRPr lang="en-US" sz="2000" dirty="0"/>
+          </a:p>
+          <a:p>
+            <a:pPr marL="0" indent="0">
+              <a:buNone/>
+            </a:pPr>
+            <a:endParaRPr lang="en-US" sz="2000" dirty="0"/>
+          </a:p>
+          <a:p>
+            <a:pPr marL="0" indent="0">
+              <a:buNone/>
+            </a:pPr>
+            <a:endParaRPr lang="en-US" sz="2000" dirty="0"/>
+          </a:p>
+          <a:p>
+            <a:pPr marL="0" indent="0">
+              <a:buNone/>
+            </a:pPr>
+            <a:endParaRPr lang="en-US" sz="2000" dirty="0"/>
+          </a:p>
+        </p:txBody>
+      </p:sp>
+    </p:spTree>
+    <p:extLst>
+      <p:ext uri="{BB962C8B-B14F-4D97-AF65-F5344CB8AC3E}">
+        <p14:creationId xmlns:p14="http://schemas.microsoft.com/office/powerpoint/2010/main" val="2730406630"/>
+      </p:ext>
+    </p:extLst>
+  </p:cSld>
+  <p:clrMapOvr>
+    <a:masterClrMapping/>
+  </p:clrMapOvr>
+</p:sld>
+</file>
+
+<file path=ppt/slides/slide20.xml><?xml version="1.0" encoding="utf-8"?>
 <p:sld xmlns:a="http://schemas.openxmlformats.org/drawingml/2006/main" xmlns:r="http://schemas.openxmlformats.org/officeDocument/2006/relationships" xmlns:p="http://schemas.openxmlformats.org/presentationml/2006/main">
   <p:cSld>
     <p:spTree>
@@ -5149,336 +5832,6 @@
     <p:extLst>
       <p:ext uri="{BB962C8B-B14F-4D97-AF65-F5344CB8AC3E}">
         <p14:creationId xmlns:p14="http://schemas.microsoft.com/office/powerpoint/2010/main" val="3744539357"/>
-      </p:ext>
-    </p:extLst>
-  </p:cSld>
-  <p:clrMapOvr>
-    <a:masterClrMapping/>
-  </p:clrMapOvr>
-</p:sld>
-</file>
-
-<file path=ppt/slides/slide2.xml><?xml version="1.0" encoding="utf-8"?>
-<p:sld xmlns:a="http://schemas.openxmlformats.org/drawingml/2006/main" xmlns:r="http://schemas.openxmlformats.org/officeDocument/2006/relationships" xmlns:p="http://schemas.openxmlformats.org/presentationml/2006/main">
-  <p:cSld>
-    <p:spTree>
-      <p:nvGrpSpPr>
-        <p:cNvPr id="1" name=""/>
-        <p:cNvGrpSpPr/>
-        <p:nvPr/>
-      </p:nvGrpSpPr>
-      <p:grpSpPr>
-        <a:xfrm>
-          <a:off x="0" y="0"/>
-          <a:ext cx="0" cy="0"/>
-          <a:chOff x="0" y="0"/>
-          <a:chExt cx="0" cy="0"/>
-        </a:xfrm>
-      </p:grpSpPr>
-      <p:sp>
-        <p:nvSpPr>
-          <p:cNvPr id="2" name="Title 1">
-            <a:extLst>
-              <a:ext uri="{FF2B5EF4-FFF2-40B4-BE49-F238E27FC236}">
-                <a16:creationId xmlns:a16="http://schemas.microsoft.com/office/drawing/2014/main" id="{E47C0F46-C0C6-470C-9FA7-130887E9E6A1}"/>
-              </a:ext>
-            </a:extLst>
-          </p:cNvPr>
-          <p:cNvSpPr>
-            <a:spLocks noGrp="1"/>
-          </p:cNvSpPr>
-          <p:nvPr>
-            <p:ph type="title"/>
-          </p:nvPr>
-        </p:nvSpPr>
-        <p:spPr/>
-        <p:txBody>
-          <a:bodyPr/>
-          <a:lstStyle/>
-          <a:p>
-            <a:r>
-              <a:rPr lang="en-US" dirty="0"/>
-              <a:t>References...</a:t>
-            </a:r>
-          </a:p>
-        </p:txBody>
-      </p:sp>
-      <p:sp>
-        <p:nvSpPr>
-          <p:cNvPr id="3" name="Content Placeholder 2">
-            <a:extLst>
-              <a:ext uri="{FF2B5EF4-FFF2-40B4-BE49-F238E27FC236}">
-                <a16:creationId xmlns:a16="http://schemas.microsoft.com/office/drawing/2014/main" id="{35A8CADA-0362-42FC-8C94-07F7338AABF8}"/>
-              </a:ext>
-            </a:extLst>
-          </p:cNvPr>
-          <p:cNvSpPr>
-            <a:spLocks noGrp="1"/>
-          </p:cNvSpPr>
-          <p:nvPr>
-            <p:ph idx="1"/>
-          </p:nvPr>
-        </p:nvSpPr>
-        <p:spPr>
-          <a:xfrm>
-            <a:off x="838200" y="1690688"/>
-            <a:ext cx="10515600" cy="4486275"/>
-          </a:xfrm>
-        </p:spPr>
-        <p:txBody>
-          <a:bodyPr>
-            <a:normAutofit fontScale="92500" lnSpcReduction="20000"/>
-          </a:bodyPr>
-          <a:lstStyle/>
-          <a:p>
-            <a:pPr marL="0" indent="0">
-              <a:buNone/>
-            </a:pPr>
-            <a:r>
-              <a:rPr lang="en-US" sz="2000" dirty="0"/>
-              <a:t>Django:</a:t>
-            </a:r>
-          </a:p>
-          <a:p>
-            <a:r>
-              <a:rPr lang="en-US" sz="2000" dirty="0"/>
-              <a:t>"Django Fundamentals“ (</a:t>
-            </a:r>
-            <a:r>
-              <a:rPr lang="en-US" sz="2000" dirty="0" err="1"/>
-              <a:t>Reindert</a:t>
-            </a:r>
-            <a:r>
-              <a:rPr lang="en-US" sz="2000" dirty="0"/>
-              <a:t>-Jan </a:t>
-            </a:r>
-            <a:r>
-              <a:rPr lang="en-US" sz="2000" dirty="0" err="1"/>
-              <a:t>Ekker</a:t>
-            </a:r>
-            <a:r>
-              <a:rPr lang="en-US" sz="2000" dirty="0"/>
-              <a:t>) </a:t>
-            </a:r>
-            <a:r>
-              <a:rPr lang="en-US" sz="2000" dirty="0">
-                <a:hlinkClick r:id="rId2"/>
-              </a:rPr>
-              <a:t>https://app.pluralsight.com</a:t>
-            </a:r>
-            <a:r>
-              <a:rPr lang="en-US" sz="2000" dirty="0"/>
-              <a:t>  This is the “</a:t>
-            </a:r>
-            <a:r>
-              <a:rPr lang="en-US" sz="2000" dirty="0" err="1"/>
-              <a:t>tictactoe</a:t>
-            </a:r>
-            <a:r>
-              <a:rPr lang="en-US" sz="2000" dirty="0"/>
-              <a:t>” application – excellent</a:t>
-            </a:r>
-          </a:p>
-          <a:p>
-            <a:r>
-              <a:rPr lang="en-US" sz="2000" dirty="0"/>
-              <a:t>Django Tutorial </a:t>
-            </a:r>
-            <a:r>
-              <a:rPr lang="en-US" sz="2000" dirty="0">
-                <a:hlinkClick r:id="rId3"/>
-              </a:rPr>
-              <a:t>https://docs.djangoproject.com/en/3.0/intro/tutorial01/</a:t>
-            </a:r>
-            <a:r>
-              <a:rPr lang="en-US" sz="2000" dirty="0"/>
-              <a:t>  Intro from The Source</a:t>
-            </a:r>
-          </a:p>
-          <a:p>
-            <a:pPr marL="0" indent="0">
-              <a:buNone/>
-            </a:pPr>
-            <a:endParaRPr lang="en-US" sz="2000" dirty="0"/>
-          </a:p>
-          <a:p>
-            <a:pPr marL="0" indent="0">
-              <a:buNone/>
-            </a:pPr>
-            <a:r>
-              <a:rPr lang="en-US" sz="2000" dirty="0"/>
-              <a:t>Node, Postgres, Express:</a:t>
-            </a:r>
-          </a:p>
-          <a:p>
-            <a:r>
-              <a:rPr lang="en-US" sz="2000" dirty="0"/>
-              <a:t>“Build a CRUD single page application with Node, Express, Angular, Postgres” (Michael Herman) </a:t>
-            </a:r>
-            <a:r>
-              <a:rPr lang="en-US" sz="2000" dirty="0">
-                <a:solidFill>
-                  <a:schemeClr val="accent1"/>
-                </a:solidFill>
-                <a:hlinkClick r:id="rId4">
-                  <a:extLst>
-                    <a:ext uri="{A12FA001-AC4F-418D-AE19-62706E023703}">
-                      <ahyp:hlinkClr xmlns:ahyp="http://schemas.microsoft.com/office/drawing/2018/hyperlinkcolor" val="tx"/>
-                    </a:ext>
-                  </a:extLst>
-                </a:hlinkClick>
-              </a:rPr>
-              <a:t>https://mherman.org/blog/postgresql-and-nodejs/</a:t>
-            </a:r>
-            <a:r>
-              <a:rPr lang="en-US" sz="2000" dirty="0">
-                <a:solidFill>
-                  <a:schemeClr val="accent1"/>
-                </a:solidFill>
-              </a:rPr>
-              <a:t>   </a:t>
-            </a:r>
-            <a:r>
-              <a:rPr lang="en-US" sz="2000" dirty="0"/>
-              <a:t>This is an example frontend/backend </a:t>
-            </a:r>
-            <a:r>
-              <a:rPr lang="en-US" sz="2000" dirty="0" err="1"/>
-              <a:t>javascript</a:t>
-            </a:r>
-            <a:r>
-              <a:rPr lang="en-US" sz="2000" dirty="0"/>
-              <a:t> web app with </a:t>
-            </a:r>
-            <a:r>
-              <a:rPr lang="en-US" sz="2000" dirty="0" err="1"/>
-              <a:t>postgres</a:t>
-            </a:r>
-            <a:r>
-              <a:rPr lang="en-US" sz="2000" dirty="0"/>
-              <a:t> db.  It uses express web server/routing and (a little) angular on the front-end.  You will use </a:t>
-            </a:r>
-            <a:r>
-              <a:rPr lang="en-US" sz="2000" dirty="0" err="1"/>
-              <a:t>npm</a:t>
-            </a:r>
-            <a:r>
-              <a:rPr lang="en-US" sz="2000" dirty="0"/>
-              <a:t>, express, node, browser trace/debug features.  You will see </a:t>
-            </a:r>
-            <a:r>
-              <a:rPr lang="en-US" sz="2000" dirty="0" err="1"/>
-              <a:t>javascript</a:t>
-            </a:r>
-            <a:r>
-              <a:rPr lang="en-US" sz="2000" dirty="0"/>
-              <a:t> used on both client and server.  This is very standard (server-side </a:t>
-            </a:r>
-            <a:r>
-              <a:rPr lang="en-US" sz="2000" dirty="0" err="1"/>
-              <a:t>javascript</a:t>
-            </a:r>
-            <a:r>
-              <a:rPr lang="en-US" sz="2000" dirty="0"/>
-              <a:t>) architecture.</a:t>
-            </a:r>
-          </a:p>
-          <a:p>
-            <a:pPr marL="0" indent="0">
-              <a:buNone/>
-            </a:pPr>
-            <a:endParaRPr lang="en-US" sz="2000" dirty="0"/>
-          </a:p>
-          <a:p>
-            <a:pPr marL="0" indent="0">
-              <a:buNone/>
-            </a:pPr>
-            <a:r>
-              <a:rPr lang="en-US" sz="2000" dirty="0"/>
-              <a:t>Front-end:</a:t>
-            </a:r>
-          </a:p>
-          <a:p>
-            <a:r>
-              <a:rPr lang="en-US" sz="2000" dirty="0"/>
-              <a:t>“Front-End Web Development Quick Start With HTML5, CSS, and JavaScript” (Shawn Wildermuth) </a:t>
-            </a:r>
-            <a:r>
-              <a:rPr lang="en-US" sz="2000" dirty="0">
-                <a:solidFill>
-                  <a:schemeClr val="accent1"/>
-                </a:solidFill>
-                <a:hlinkClick r:id="rId5">
-                  <a:extLst>
-                    <a:ext uri="{A12FA001-AC4F-418D-AE19-62706E023703}">
-                      <ahyp:hlinkClr xmlns:ahyp="http://schemas.microsoft.com/office/drawing/2018/hyperlinkcolor" val="tx"/>
-                    </a:ext>
-                  </a:extLst>
-                </a:hlinkClick>
-              </a:rPr>
-              <a:t>https://app.pluralsight.com/course-player?clipId=e5482b13-c204-4d52-89ec-94a1099592b0</a:t>
-            </a:r>
-            <a:r>
-              <a:rPr lang="en-US" sz="2000" dirty="0">
-                <a:solidFill>
-                  <a:schemeClr val="accent1"/>
-                </a:solidFill>
-              </a:rPr>
-              <a:t>  </a:t>
-            </a:r>
-            <a:r>
-              <a:rPr lang="en-US" sz="2000" dirty="0"/>
-              <a:t>Beginner HTML5, CSS, JavaScript – excellent</a:t>
-            </a:r>
-          </a:p>
-          <a:p>
-            <a:pPr marL="0" indent="0">
-              <a:buNone/>
-            </a:pPr>
-            <a:endParaRPr lang="en-US" sz="2000" dirty="0"/>
-          </a:p>
-          <a:p>
-            <a:pPr marL="0" indent="0">
-              <a:buNone/>
-            </a:pPr>
-            <a:endParaRPr lang="en-US" sz="2000" dirty="0"/>
-          </a:p>
-          <a:p>
-            <a:pPr marL="0" indent="0">
-              <a:buNone/>
-            </a:pPr>
-            <a:endParaRPr lang="en-US" sz="2000" dirty="0"/>
-          </a:p>
-          <a:p>
-            <a:pPr marL="0" indent="0">
-              <a:buNone/>
-            </a:pPr>
-            <a:endParaRPr lang="en-US" sz="2000" dirty="0"/>
-          </a:p>
-          <a:p>
-            <a:pPr marL="0" indent="0">
-              <a:buNone/>
-            </a:pPr>
-            <a:endParaRPr lang="en-US" sz="2000" dirty="0"/>
-          </a:p>
-          <a:p>
-            <a:pPr marL="0" indent="0">
-              <a:buNone/>
-            </a:pPr>
-            <a:endParaRPr lang="en-US" sz="2000" dirty="0"/>
-          </a:p>
-          <a:p>
-            <a:pPr marL="0" indent="0">
-              <a:buNone/>
-            </a:pPr>
-            <a:endParaRPr lang="en-US" sz="2000" dirty="0"/>
-          </a:p>
-        </p:txBody>
-      </p:sp>
-    </p:spTree>
-    <p:extLst>
-      <p:ext uri="{BB962C8B-B14F-4D97-AF65-F5344CB8AC3E}">
-        <p14:creationId xmlns:p14="http://schemas.microsoft.com/office/powerpoint/2010/main" val="2730406630"/>
       </p:ext>
     </p:extLst>
   </p:cSld>
@@ -6095,6 +6448,124 @@
       </p:grpSpPr>
       <p:sp>
         <p:nvSpPr>
+          <p:cNvPr id="2" name="Title 1">
+            <a:extLst>
+              <a:ext uri="{FF2B5EF4-FFF2-40B4-BE49-F238E27FC236}">
+                <a16:creationId xmlns:a16="http://schemas.microsoft.com/office/drawing/2014/main" id="{F9EC54D2-25F5-479F-8B28-7A2899723364}"/>
+              </a:ext>
+            </a:extLst>
+          </p:cNvPr>
+          <p:cNvSpPr>
+            <a:spLocks noGrp="1"/>
+          </p:cNvSpPr>
+          <p:nvPr>
+            <p:ph type="title"/>
+          </p:nvPr>
+        </p:nvSpPr>
+        <p:spPr/>
+        <p:txBody>
+          <a:bodyPr/>
+          <a:lstStyle/>
+          <a:p>
+            <a:r>
+              <a:rPr lang="en-US" dirty="0"/>
+              <a:t>Explore the app...</a:t>
+            </a:r>
+          </a:p>
+        </p:txBody>
+      </p:sp>
+      <p:sp>
+        <p:nvSpPr>
+          <p:cNvPr id="3" name="Content Placeholder 2">
+            <a:extLst>
+              <a:ext uri="{FF2B5EF4-FFF2-40B4-BE49-F238E27FC236}">
+                <a16:creationId xmlns:a16="http://schemas.microsoft.com/office/drawing/2014/main" id="{69297A70-665E-4C1B-B761-CA82652EDC98}"/>
+              </a:ext>
+            </a:extLst>
+          </p:cNvPr>
+          <p:cNvSpPr>
+            <a:spLocks noGrp="1"/>
+          </p:cNvSpPr>
+          <p:nvPr>
+            <p:ph idx="1"/>
+          </p:nvPr>
+        </p:nvSpPr>
+        <p:spPr/>
+        <p:txBody>
+          <a:bodyPr/>
+          <a:lstStyle/>
+          <a:p>
+            <a:r>
+              <a:rPr lang="en-US" dirty="0">
+                <a:hlinkClick r:id="rId2"/>
+              </a:rPr>
+              <a:t>http://x.x.x.x:9595</a:t>
+            </a:r>
+            <a:endParaRPr lang="en-US" dirty="0"/>
+          </a:p>
+          <a:p>
+            <a:endParaRPr lang="en-US" dirty="0"/>
+          </a:p>
+          <a:p>
+            <a:r>
+              <a:rPr lang="en-US" dirty="0" err="1"/>
+              <a:t>alice</a:t>
+            </a:r>
+            <a:r>
+              <a:rPr lang="en-US" dirty="0"/>
+              <a:t>   </a:t>
+            </a:r>
+            <a:r>
+              <a:rPr lang="en-US" dirty="0" err="1"/>
+              <a:t>aabbddcc</a:t>
+            </a:r>
+            <a:endParaRPr lang="en-US" dirty="0"/>
+          </a:p>
+          <a:p>
+            <a:r>
+              <a:rPr lang="en-US" dirty="0"/>
+              <a:t>bob    </a:t>
+            </a:r>
+            <a:r>
+              <a:rPr lang="en-US" dirty="0" err="1"/>
+              <a:t>aabbddcc</a:t>
+            </a:r>
+            <a:endParaRPr lang="en-US" dirty="0"/>
+          </a:p>
+        </p:txBody>
+      </p:sp>
+    </p:spTree>
+    <p:extLst>
+      <p:ext uri="{BB962C8B-B14F-4D97-AF65-F5344CB8AC3E}">
+        <p14:creationId xmlns:p14="http://schemas.microsoft.com/office/powerpoint/2010/main" val="1467692152"/>
+      </p:ext>
+    </p:extLst>
+  </p:cSld>
+  <p:clrMapOvr>
+    <a:masterClrMapping/>
+  </p:clrMapOvr>
+</p:sld>
+</file>
+
+<file path=ppt/slides/slide8.xml><?xml version="1.0" encoding="utf-8"?>
+<p:sld xmlns:a="http://schemas.openxmlformats.org/drawingml/2006/main" xmlns:r="http://schemas.openxmlformats.org/officeDocument/2006/relationships" xmlns:p="http://schemas.openxmlformats.org/presentationml/2006/main">
+  <p:cSld>
+    <p:spTree>
+      <p:nvGrpSpPr>
+        <p:cNvPr id="1" name=""/>
+        <p:cNvGrpSpPr/>
+        <p:nvPr/>
+      </p:nvGrpSpPr>
+      <p:grpSpPr>
+        <a:xfrm>
+          <a:off x="0" y="0"/>
+          <a:ext cx="0" cy="0"/>
+          <a:chOff x="0" y="0"/>
+          <a:chExt cx="0" cy="0"/>
+        </a:xfrm>
+      </p:grpSpPr>
+      <p:sp>
+        <p:nvSpPr>
           <p:cNvPr id="35" name="Rectangle 34">
             <a:extLst>
               <a:ext uri="{FF2B5EF4-FFF2-40B4-BE49-F238E27FC236}">
@@ -6846,7 +7317,7 @@
 </p:sld>
 </file>
 
-<file path=ppt/slides/slide8.xml><?xml version="1.0" encoding="utf-8"?>
+<file path=ppt/slides/slide9.xml><?xml version="1.0" encoding="utf-8"?>
 <p:sld xmlns:a="http://schemas.openxmlformats.org/drawingml/2006/main" xmlns:r="http://schemas.openxmlformats.org/officeDocument/2006/relationships" xmlns:p="http://schemas.openxmlformats.org/presentationml/2006/main">
   <p:cSld>
     <p:spTree>
@@ -6925,218 +7396,6 @@
     <p:extLst>
       <p:ext uri="{BB962C8B-B14F-4D97-AF65-F5344CB8AC3E}">
         <p14:creationId xmlns:p14="http://schemas.microsoft.com/office/powerpoint/2010/main" val="201048017"/>
-      </p:ext>
-    </p:extLst>
-  </p:cSld>
-  <p:clrMapOvr>
-    <a:masterClrMapping/>
-  </p:clrMapOvr>
-</p:sld>
-</file>
-
-<file path=ppt/slides/slide9.xml><?xml version="1.0" encoding="utf-8"?>
-<p:sld xmlns:a="http://schemas.openxmlformats.org/drawingml/2006/main" xmlns:r="http://schemas.openxmlformats.org/officeDocument/2006/relationships" xmlns:p="http://schemas.openxmlformats.org/presentationml/2006/main">
-  <p:cSld>
-    <p:spTree>
-      <p:nvGrpSpPr>
-        <p:cNvPr id="1" name=""/>
-        <p:cNvGrpSpPr/>
-        <p:nvPr/>
-      </p:nvGrpSpPr>
-      <p:grpSpPr>
-        <a:xfrm>
-          <a:off x="0" y="0"/>
-          <a:ext cx="0" cy="0"/>
-          <a:chOff x="0" y="0"/>
-          <a:chExt cx="0" cy="0"/>
-        </a:xfrm>
-      </p:grpSpPr>
-      <p:sp>
-        <p:nvSpPr>
-          <p:cNvPr id="2" name="Title 1">
-            <a:extLst>
-              <a:ext uri="{FF2B5EF4-FFF2-40B4-BE49-F238E27FC236}">
-                <a16:creationId xmlns:a16="http://schemas.microsoft.com/office/drawing/2014/main" id="{9AD171FB-ACEA-4089-9386-2524C758BD46}"/>
-              </a:ext>
-            </a:extLst>
-          </p:cNvPr>
-          <p:cNvSpPr>
-            <a:spLocks noGrp="1"/>
-          </p:cNvSpPr>
-          <p:nvPr>
-            <p:ph type="title"/>
-          </p:nvPr>
-        </p:nvSpPr>
-        <p:spPr>
-          <a:xfrm>
-            <a:off x="1061156" y="365126"/>
-            <a:ext cx="10292644" cy="966964"/>
-          </a:xfrm>
-        </p:spPr>
-        <p:txBody>
-          <a:bodyPr/>
-          <a:lstStyle/>
-          <a:p>
-            <a:r>
-              <a:rPr lang="en-US" dirty="0"/>
-              <a:t>View</a:t>
-            </a:r>
-          </a:p>
-        </p:txBody>
-      </p:sp>
-      <p:sp>
-        <p:nvSpPr>
-          <p:cNvPr id="6" name="Content Placeholder 2">
-            <a:extLst>
-              <a:ext uri="{FF2B5EF4-FFF2-40B4-BE49-F238E27FC236}">
-                <a16:creationId xmlns:a16="http://schemas.microsoft.com/office/drawing/2014/main" id="{3B631ABF-B560-42B3-945D-A1F83962A5D9}"/>
-              </a:ext>
-            </a:extLst>
-          </p:cNvPr>
-          <p:cNvSpPr>
-            <a:spLocks noGrp="1"/>
-          </p:cNvSpPr>
-          <p:nvPr>
-            <p:ph idx="1"/>
-          </p:nvPr>
-        </p:nvSpPr>
-        <p:spPr>
-          <a:xfrm>
-            <a:off x="327378" y="1529996"/>
-            <a:ext cx="4007555" cy="4566004"/>
-          </a:xfrm>
-        </p:spPr>
-        <p:txBody>
-          <a:bodyPr>
-            <a:normAutofit fontScale="92500" lnSpcReduction="20000"/>
-          </a:bodyPr>
-          <a:lstStyle/>
-          <a:p>
-            <a:pPr marL="0" indent="0">
-              <a:buNone/>
-            </a:pPr>
-            <a:r>
-              <a:rPr lang="en-US" dirty="0"/>
-              <a:t>Receive request</a:t>
-            </a:r>
-          </a:p>
-          <a:p>
-            <a:endParaRPr lang="en-US" dirty="0"/>
-          </a:p>
-          <a:p>
-            <a:pPr marL="0" indent="0">
-              <a:buNone/>
-            </a:pPr>
-            <a:r>
-              <a:rPr lang="en-US" dirty="0"/>
-              <a:t>If GET:</a:t>
-            </a:r>
-          </a:p>
-          <a:p>
-            <a:pPr marL="457200" lvl="1" indent="0">
-              <a:buNone/>
-            </a:pPr>
-            <a:r>
-              <a:rPr lang="en-US" sz="2000" dirty="0"/>
-              <a:t>Create a blank form and return it</a:t>
-            </a:r>
-            <a:endParaRPr lang="en-US" sz="1600" dirty="0"/>
-          </a:p>
-          <a:p>
-            <a:endParaRPr lang="en-US" dirty="0"/>
-          </a:p>
-          <a:p>
-            <a:pPr marL="0" indent="0">
-              <a:buNone/>
-            </a:pPr>
-            <a:r>
-              <a:rPr lang="en-US" dirty="0"/>
-              <a:t>If POST:</a:t>
-            </a:r>
-          </a:p>
-          <a:p>
-            <a:pPr marL="457200" lvl="1" indent="0">
-              <a:buNone/>
-            </a:pPr>
-            <a:r>
-              <a:rPr lang="en-US" sz="2000" dirty="0"/>
-              <a:t>Create a form using data from the POST (i.e. validate the data)</a:t>
-            </a:r>
-          </a:p>
-          <a:p>
-            <a:pPr marL="457200" lvl="1" indent="0">
-              <a:buNone/>
-            </a:pPr>
-            <a:endParaRPr lang="en-US" sz="2000" dirty="0"/>
-          </a:p>
-          <a:p>
-            <a:pPr marL="457200" lvl="1" indent="0">
-              <a:buNone/>
-            </a:pPr>
-            <a:r>
-              <a:rPr lang="en-US" sz="2000" dirty="0"/>
-              <a:t>If valid – save to DB and redirect to </a:t>
-            </a:r>
-            <a:r>
-              <a:rPr lang="en-US" sz="2000" dirty="0" err="1"/>
-              <a:t>player_home</a:t>
-            </a:r>
-            <a:r>
-              <a:rPr lang="en-US" sz="2000" dirty="0"/>
-              <a:t> page</a:t>
-            </a:r>
-          </a:p>
-          <a:p>
-            <a:pPr marL="457200" lvl="1" indent="0">
-              <a:buNone/>
-            </a:pPr>
-            <a:endParaRPr lang="en-US" sz="2000" dirty="0"/>
-          </a:p>
-          <a:p>
-            <a:pPr marL="457200" lvl="1" indent="0">
-              <a:buNone/>
-            </a:pPr>
-            <a:r>
-              <a:rPr lang="en-US" sz="2000" dirty="0"/>
-              <a:t>If not valid – send form back to user (with errors)</a:t>
-            </a:r>
-          </a:p>
-        </p:txBody>
-      </p:sp>
-      <p:pic>
-        <p:nvPicPr>
-          <p:cNvPr id="8" name="Picture 7">
-            <a:extLst>
-              <a:ext uri="{FF2B5EF4-FFF2-40B4-BE49-F238E27FC236}">
-                <a16:creationId xmlns:a16="http://schemas.microsoft.com/office/drawing/2014/main" id="{9C248E4E-1512-4E81-88B4-C64DC453A8E6}"/>
-              </a:ext>
-            </a:extLst>
-          </p:cNvPr>
-          <p:cNvPicPr>
-            <a:picLocks noChangeAspect="1"/>
-          </p:cNvPicPr>
-          <p:nvPr/>
-        </p:nvPicPr>
-        <p:blipFill>
-          <a:blip r:embed="rId2"/>
-          <a:stretch>
-            <a:fillRect/>
-          </a:stretch>
-        </p:blipFill>
-        <p:spPr>
-          <a:xfrm>
-            <a:off x="4460982" y="1529996"/>
-            <a:ext cx="7403640" cy="4962879"/>
-          </a:xfrm>
-          <a:prstGeom prst="rect">
-            <a:avLst/>
-          </a:prstGeom>
-        </p:spPr>
-      </p:pic>
-    </p:spTree>
-    <p:extLst>
-      <p:ext uri="{BB962C8B-B14F-4D97-AF65-F5344CB8AC3E}">
-        <p14:creationId xmlns:p14="http://schemas.microsoft.com/office/powerpoint/2010/main" val="3033193438"/>
       </p:ext>
     </p:extLst>
   </p:cSld>

</xml_diff>

<commit_message>
another minor presentation update
</commit_message>
<xml_diff>
--- a/presentation.pptx
+++ b/presentation.pptx
@@ -6499,11 +6499,33 @@
               <a:rPr lang="en-US" dirty="0">
                 <a:hlinkClick r:id="rId2"/>
               </a:rPr>
+              <a:t>python manage.py </a:t>
+            </a:r>
+            <a:r>
+              <a:rPr lang="en-US" dirty="0" err="1">
+                <a:hlinkClick r:id="rId2"/>
+              </a:rPr>
+              <a:t>runserver</a:t>
+            </a:r>
+            <a:r>
+              <a:rPr lang="en-US" dirty="0">
+                <a:hlinkClick r:id="rId2"/>
+              </a:rPr>
+              <a:t> 0.0.0.0:9595</a:t>
+            </a:r>
+          </a:p>
+          <a:p>
+            <a:endParaRPr lang="en-US" dirty="0">
+              <a:hlinkClick r:id="rId2"/>
+            </a:endParaRPr>
+          </a:p>
+          <a:p>
+            <a:r>
+              <a:rPr lang="en-US" dirty="0">
+                <a:hlinkClick r:id="rId2"/>
+              </a:rPr>
               <a:t>http://x.x.x.x:9595</a:t>
             </a:r>
-            <a:endParaRPr lang="en-US" dirty="0"/>
-          </a:p>
-          <a:p>
             <a:endParaRPr lang="en-US" dirty="0"/>
           </a:p>
           <a:p>

</xml_diff>